<commit_message>
lecture20 & 21 update (again)
</commit_message>
<xml_diff>
--- a/content/lectures/lecture20/presentation/cs109b_RL.pptx
+++ b/content/lectures/lecture20/presentation/cs109b_RL.pptx
@@ -5,7 +5,7 @@
     <p:sldMasterId id="2147483677" r:id="rId1"/>
   </p:sldMasterIdLst>
   <p:notesMasterIdLst>
-    <p:notesMasterId r:id="rId61"/>
+    <p:notesMasterId r:id="rId64"/>
   </p:notesMasterIdLst>
   <p:sldIdLst>
     <p:sldId id="284" r:id="rId2"/>
@@ -67,6 +67,9 @@
     <p:sldId id="373" r:id="rId58"/>
     <p:sldId id="374" r:id="rId59"/>
     <p:sldId id="375" r:id="rId60"/>
+    <p:sldId id="377" r:id="rId61"/>
+    <p:sldId id="378" r:id="rId62"/>
+    <p:sldId id="376" r:id="rId63"/>
   </p:sldIdLst>
   <p:sldSz cx="9144000" cy="5143500" type="screen16x9"/>
   <p:notesSz cx="6858000" cy="9144000"/>
@@ -38957,6 +38960,2178 @@
 </p:sld>
 </file>
 
+<file path=ppt/slides/slide60.xml><?xml version="1.0" encoding="utf-8"?>
+<p:sld xmlns:a="http://schemas.openxmlformats.org/drawingml/2006/main" xmlns:r="http://schemas.openxmlformats.org/officeDocument/2006/relationships" xmlns:p="http://schemas.openxmlformats.org/presentationml/2006/main">
+  <p:cSld>
+    <p:spTree>
+      <p:nvGrpSpPr>
+        <p:cNvPr id="1" name=""/>
+        <p:cNvGrpSpPr/>
+        <p:nvPr/>
+      </p:nvGrpSpPr>
+      <p:grpSpPr>
+        <a:xfrm>
+          <a:off x="0" y="0"/>
+          <a:ext cx="0" cy="0"/>
+          <a:chOff x="0" y="0"/>
+          <a:chExt cx="0" cy="0"/>
+        </a:xfrm>
+      </p:grpSpPr>
+      <p:sp>
+        <p:nvSpPr>
+          <p:cNvPr id="3" name="Oval 2"/>
+          <p:cNvSpPr/>
+          <p:nvPr/>
+        </p:nvSpPr>
+        <p:spPr>
+          <a:xfrm>
+            <a:off x="2220261" y="2336124"/>
+            <a:ext cx="1682353" cy="964406"/>
+          </a:xfrm>
+          <a:prstGeom prst="ellipse">
+            <a:avLst/>
+          </a:prstGeom>
+          <a:solidFill>
+            <a:schemeClr val="accent2">
+              <a:lumMod val="40000"/>
+              <a:lumOff val="60000"/>
+            </a:schemeClr>
+          </a:solidFill>
+        </p:spPr>
+        <p:style>
+          <a:lnRef idx="2">
+            <a:schemeClr val="dk1"/>
+          </a:lnRef>
+          <a:fillRef idx="1">
+            <a:schemeClr val="lt1"/>
+          </a:fillRef>
+          <a:effectRef idx="0">
+            <a:schemeClr val="dk1"/>
+          </a:effectRef>
+          <a:fontRef idx="minor">
+            <a:schemeClr val="dk1"/>
+          </a:fontRef>
+        </p:style>
+        <p:txBody>
+          <a:bodyPr rtlCol="0" anchor="ctr"/>
+          <a:lstStyle/>
+          <a:p>
+            <a:pPr algn="ctr"/>
+            <a:r>
+              <a:rPr lang="en-US" sz="1050" b="1" dirty="0">
+                <a:solidFill>
+                  <a:schemeClr val="tx1"/>
+                </a:solidFill>
+              </a:rPr>
+              <a:t>Regression</a:t>
+            </a:r>
+            <a:endParaRPr lang="en-US" sz="1050" dirty="0">
+              <a:solidFill>
+                <a:schemeClr val="tx1"/>
+              </a:solidFill>
+            </a:endParaRPr>
+          </a:p>
+        </p:txBody>
+      </p:sp>
+      <p:sp>
+        <p:nvSpPr>
+          <p:cNvPr id="4" name="Oval 3"/>
+          <p:cNvSpPr/>
+          <p:nvPr/>
+        </p:nvSpPr>
+        <p:spPr>
+          <a:xfrm>
+            <a:off x="1791004" y="1038227"/>
+            <a:ext cx="1575058" cy="655320"/>
+          </a:xfrm>
+          <a:prstGeom prst="ellipse">
+            <a:avLst/>
+          </a:prstGeom>
+          <a:solidFill>
+            <a:schemeClr val="accent6">
+              <a:lumMod val="40000"/>
+              <a:lumOff val="60000"/>
+            </a:schemeClr>
+          </a:solidFill>
+        </p:spPr>
+        <p:style>
+          <a:lnRef idx="2">
+            <a:schemeClr val="dk1"/>
+          </a:lnRef>
+          <a:fillRef idx="1">
+            <a:schemeClr val="lt1"/>
+          </a:fillRef>
+          <a:effectRef idx="0">
+            <a:schemeClr val="dk1"/>
+          </a:effectRef>
+          <a:fontRef idx="minor">
+            <a:schemeClr val="dk1"/>
+          </a:fontRef>
+        </p:style>
+        <p:txBody>
+          <a:bodyPr rtlCol="0" anchor="ctr"/>
+          <a:lstStyle/>
+          <a:p>
+            <a:pPr algn="ctr"/>
+            <a:r>
+              <a:rPr lang="en-US" sz="1050" dirty="0"/>
+              <a:t>Statistical Learning</a:t>
+            </a:r>
+          </a:p>
+        </p:txBody>
+      </p:sp>
+      <p:sp>
+        <p:nvSpPr>
+          <p:cNvPr id="5" name="Oval 4"/>
+          <p:cNvSpPr/>
+          <p:nvPr/>
+        </p:nvSpPr>
+        <p:spPr>
+          <a:xfrm>
+            <a:off x="24910" y="65582"/>
+            <a:ext cx="1682352" cy="1043825"/>
+          </a:xfrm>
+          <a:prstGeom prst="ellipse">
+            <a:avLst/>
+          </a:prstGeom>
+          <a:solidFill>
+            <a:schemeClr val="accent6">
+              <a:lumMod val="40000"/>
+              <a:lumOff val="60000"/>
+            </a:schemeClr>
+          </a:solidFill>
+        </p:spPr>
+        <p:style>
+          <a:lnRef idx="2">
+            <a:schemeClr val="dk1"/>
+          </a:lnRef>
+          <a:fillRef idx="1">
+            <a:schemeClr val="lt1"/>
+          </a:fillRef>
+          <a:effectRef idx="0">
+            <a:schemeClr val="dk1"/>
+          </a:effectRef>
+          <a:fontRef idx="minor">
+            <a:schemeClr val="dk1"/>
+          </a:fontRef>
+        </p:style>
+        <p:txBody>
+          <a:bodyPr rtlCol="0" anchor="ctr"/>
+          <a:lstStyle/>
+          <a:p>
+            <a:pPr algn="ctr"/>
+            <a:r>
+              <a:rPr lang="en-US" sz="1050" dirty="0"/>
+              <a:t>Uncertainty in model and prediction </a:t>
+            </a:r>
+          </a:p>
+        </p:txBody>
+      </p:sp>
+      <p:sp>
+        <p:nvSpPr>
+          <p:cNvPr id="6" name="Oval 5"/>
+          <p:cNvSpPr/>
+          <p:nvPr/>
+        </p:nvSpPr>
+        <p:spPr>
+          <a:xfrm>
+            <a:off x="1742713" y="42445"/>
+            <a:ext cx="1192997" cy="701594"/>
+          </a:xfrm>
+          <a:prstGeom prst="ellipse">
+            <a:avLst/>
+          </a:prstGeom>
+          <a:solidFill>
+            <a:schemeClr val="accent6">
+              <a:lumMod val="40000"/>
+              <a:lumOff val="60000"/>
+            </a:schemeClr>
+          </a:solidFill>
+          <a:ln>
+            <a:solidFill>
+              <a:schemeClr val="tx1">
+                <a:lumMod val="75000"/>
+                <a:lumOff val="25000"/>
+              </a:schemeClr>
+            </a:solidFill>
+          </a:ln>
+          <a:effectLst/>
+        </p:spPr>
+        <p:style>
+          <a:lnRef idx="2">
+            <a:schemeClr val="dk1"/>
+          </a:lnRef>
+          <a:fillRef idx="1">
+            <a:schemeClr val="lt1"/>
+          </a:fillRef>
+          <a:effectRef idx="0">
+            <a:schemeClr val="dk1"/>
+          </a:effectRef>
+          <a:fontRef idx="minor">
+            <a:schemeClr val="dk1"/>
+          </a:fontRef>
+        </p:style>
+        <p:txBody>
+          <a:bodyPr rtlCol="0" anchor="ctr"/>
+          <a:lstStyle/>
+          <a:p>
+            <a:pPr algn="ctr"/>
+            <a:r>
+              <a:rPr lang="en-US" sz="1050" dirty="0"/>
+              <a:t>Cross validation </a:t>
+            </a:r>
+          </a:p>
+        </p:txBody>
+      </p:sp>
+      <p:sp>
+        <p:nvSpPr>
+          <p:cNvPr id="8" name="Oval 7"/>
+          <p:cNvSpPr/>
+          <p:nvPr/>
+        </p:nvSpPr>
+        <p:spPr>
+          <a:xfrm>
+            <a:off x="2986605" y="38912"/>
+            <a:ext cx="1459288" cy="776661"/>
+          </a:xfrm>
+          <a:prstGeom prst="ellipse">
+            <a:avLst/>
+          </a:prstGeom>
+          <a:solidFill>
+            <a:schemeClr val="accent6">
+              <a:lumMod val="40000"/>
+              <a:lumOff val="60000"/>
+            </a:schemeClr>
+          </a:solidFill>
+        </p:spPr>
+        <p:style>
+          <a:lnRef idx="2">
+            <a:schemeClr val="dk1"/>
+          </a:lnRef>
+          <a:fillRef idx="1">
+            <a:schemeClr val="lt1"/>
+          </a:fillRef>
+          <a:effectRef idx="0">
+            <a:schemeClr val="dk1"/>
+          </a:effectRef>
+          <a:fontRef idx="minor">
+            <a:schemeClr val="dk1"/>
+          </a:fontRef>
+        </p:style>
+        <p:txBody>
+          <a:bodyPr rtlCol="0" anchor="ctr"/>
+          <a:lstStyle/>
+          <a:p>
+            <a:pPr algn="ctr"/>
+            <a:r>
+              <a:rPr lang="en-US" sz="1050" dirty="0"/>
+              <a:t>Overfitting: Variance &amp; Bias</a:t>
+            </a:r>
+          </a:p>
+        </p:txBody>
+      </p:sp>
+      <p:sp>
+        <p:nvSpPr>
+          <p:cNvPr id="9" name="Oval 8"/>
+          <p:cNvSpPr/>
+          <p:nvPr/>
+        </p:nvSpPr>
+        <p:spPr>
+          <a:xfrm>
+            <a:off x="21454" y="1252492"/>
+            <a:ext cx="1703123" cy="1094285"/>
+          </a:xfrm>
+          <a:prstGeom prst="ellipse">
+            <a:avLst/>
+          </a:prstGeom>
+          <a:solidFill>
+            <a:schemeClr val="accent6">
+              <a:lumMod val="40000"/>
+              <a:lumOff val="60000"/>
+            </a:schemeClr>
+          </a:solidFill>
+        </p:spPr>
+        <p:style>
+          <a:lnRef idx="2">
+            <a:schemeClr val="dk1"/>
+          </a:lnRef>
+          <a:fillRef idx="1">
+            <a:schemeClr val="lt1"/>
+          </a:fillRef>
+          <a:effectRef idx="0">
+            <a:schemeClr val="dk1"/>
+          </a:effectRef>
+          <a:fontRef idx="minor">
+            <a:schemeClr val="dk1"/>
+          </a:fontRef>
+        </p:style>
+        <p:txBody>
+          <a:bodyPr rtlCol="0" anchor="ctr"/>
+          <a:lstStyle/>
+          <a:p>
+            <a:pPr algn="ctr"/>
+            <a:r>
+              <a:rPr lang="en-US" sz="1050" dirty="0"/>
+              <a:t>Methods of regularization: </a:t>
+            </a:r>
+          </a:p>
+          <a:p>
+            <a:pPr algn="ctr"/>
+            <a:r>
+              <a:rPr lang="en-US" sz="1050" dirty="0"/>
+              <a:t>Lasso and Ridge</a:t>
+            </a:r>
+          </a:p>
+        </p:txBody>
+      </p:sp>
+      <p:sp>
+        <p:nvSpPr>
+          <p:cNvPr id="11" name="Oval 10"/>
+          <p:cNvSpPr/>
+          <p:nvPr/>
+        </p:nvSpPr>
+        <p:spPr>
+          <a:xfrm>
+            <a:off x="4839010" y="2346777"/>
+            <a:ext cx="1682352" cy="964406"/>
+          </a:xfrm>
+          <a:prstGeom prst="ellipse">
+            <a:avLst/>
+          </a:prstGeom>
+          <a:solidFill>
+            <a:schemeClr val="accent3">
+              <a:lumMod val="60000"/>
+              <a:lumOff val="40000"/>
+            </a:schemeClr>
+          </a:solidFill>
+        </p:spPr>
+        <p:style>
+          <a:lnRef idx="2">
+            <a:schemeClr val="dk1"/>
+          </a:lnRef>
+          <a:fillRef idx="1">
+            <a:schemeClr val="lt1"/>
+          </a:fillRef>
+          <a:effectRef idx="0">
+            <a:schemeClr val="dk1"/>
+          </a:effectRef>
+          <a:fontRef idx="minor">
+            <a:schemeClr val="dk1"/>
+          </a:fontRef>
+        </p:style>
+        <p:txBody>
+          <a:bodyPr rtlCol="0" anchor="ctr"/>
+          <a:lstStyle/>
+          <a:p>
+            <a:pPr algn="ctr"/>
+            <a:r>
+              <a:rPr lang="en-US" sz="1050" b="1" dirty="0">
+                <a:solidFill>
+                  <a:schemeClr val="tx1"/>
+                </a:solidFill>
+              </a:rPr>
+              <a:t>Classification</a:t>
+            </a:r>
+            <a:endParaRPr lang="en-US" sz="1050" dirty="0">
+              <a:solidFill>
+                <a:schemeClr val="tx1"/>
+              </a:solidFill>
+            </a:endParaRPr>
+          </a:p>
+        </p:txBody>
+      </p:sp>
+      <p:sp>
+        <p:nvSpPr>
+          <p:cNvPr id="12" name="Oval 11"/>
+          <p:cNvSpPr/>
+          <p:nvPr/>
+        </p:nvSpPr>
+        <p:spPr>
+          <a:xfrm>
+            <a:off x="3631158" y="803113"/>
+            <a:ext cx="1682352" cy="903179"/>
+          </a:xfrm>
+          <a:prstGeom prst="ellipse">
+            <a:avLst/>
+          </a:prstGeom>
+          <a:solidFill>
+            <a:schemeClr val="accent6">
+              <a:lumMod val="40000"/>
+              <a:lumOff val="60000"/>
+            </a:schemeClr>
+          </a:solidFill>
+        </p:spPr>
+        <p:style>
+          <a:lnRef idx="2">
+            <a:schemeClr val="dk1"/>
+          </a:lnRef>
+          <a:fillRef idx="1">
+            <a:schemeClr val="lt1"/>
+          </a:fillRef>
+          <a:effectRef idx="0">
+            <a:schemeClr val="dk1"/>
+          </a:effectRef>
+          <a:fontRef idx="minor">
+            <a:schemeClr val="dk1"/>
+          </a:fontRef>
+        </p:style>
+        <p:txBody>
+          <a:bodyPr rtlCol="0" anchor="ctr"/>
+          <a:lstStyle/>
+          <a:p>
+            <a:pPr algn="ctr"/>
+            <a:r>
+              <a:rPr lang="en-US" sz="1050" dirty="0"/>
+              <a:t>PCA &amp; dimensionality reduction </a:t>
+            </a:r>
+          </a:p>
+        </p:txBody>
+      </p:sp>
+      <p:sp>
+        <p:nvSpPr>
+          <p:cNvPr id="13" name="Oval 12"/>
+          <p:cNvSpPr/>
+          <p:nvPr/>
+        </p:nvSpPr>
+        <p:spPr>
+          <a:xfrm>
+            <a:off x="5247559" y="87149"/>
+            <a:ext cx="924521" cy="749990"/>
+          </a:xfrm>
+          <a:prstGeom prst="ellipse">
+            <a:avLst/>
+          </a:prstGeom>
+          <a:solidFill>
+            <a:schemeClr val="tx2">
+              <a:lumMod val="40000"/>
+              <a:lumOff val="60000"/>
+            </a:schemeClr>
+          </a:solidFill>
+        </p:spPr>
+        <p:style>
+          <a:lnRef idx="2">
+            <a:schemeClr val="dk1"/>
+          </a:lnRef>
+          <a:fillRef idx="1">
+            <a:schemeClr val="lt1"/>
+          </a:fillRef>
+          <a:effectRef idx="0">
+            <a:schemeClr val="dk1"/>
+          </a:effectRef>
+          <a:fontRef idx="minor">
+            <a:schemeClr val="dk1"/>
+          </a:fontRef>
+        </p:style>
+        <p:txBody>
+          <a:bodyPr rtlCol="0" anchor="ctr"/>
+          <a:lstStyle/>
+          <a:p>
+            <a:pPr algn="ctr"/>
+            <a:r>
+              <a:rPr lang="en-US" sz="1050" dirty="0"/>
+              <a:t>Pandas</a:t>
+            </a:r>
+          </a:p>
+        </p:txBody>
+      </p:sp>
+      <p:sp>
+        <p:nvSpPr>
+          <p:cNvPr id="14" name="Oval 13"/>
+          <p:cNvSpPr/>
+          <p:nvPr/>
+        </p:nvSpPr>
+        <p:spPr>
+          <a:xfrm>
+            <a:off x="7759620" y="1080785"/>
+            <a:ext cx="1293805" cy="749990"/>
+          </a:xfrm>
+          <a:prstGeom prst="ellipse">
+            <a:avLst/>
+          </a:prstGeom>
+          <a:solidFill>
+            <a:schemeClr val="tx2">
+              <a:lumMod val="40000"/>
+              <a:lumOff val="60000"/>
+            </a:schemeClr>
+          </a:solidFill>
+        </p:spPr>
+        <p:style>
+          <a:lnRef idx="2">
+            <a:schemeClr val="dk1"/>
+          </a:lnRef>
+          <a:fillRef idx="1">
+            <a:schemeClr val="lt1"/>
+          </a:fillRef>
+          <a:effectRef idx="0">
+            <a:schemeClr val="dk1"/>
+          </a:effectRef>
+          <a:fontRef idx="minor">
+            <a:schemeClr val="dk1"/>
+          </a:fontRef>
+        </p:style>
+        <p:txBody>
+          <a:bodyPr rtlCol="0" anchor="ctr"/>
+          <a:lstStyle/>
+          <a:p>
+            <a:pPr algn="ctr"/>
+            <a:r>
+              <a:rPr lang="en-US" sz="1050" dirty="0" err="1"/>
+              <a:t>Matplotlib</a:t>
+            </a:r>
+            <a:endParaRPr lang="en-US" sz="1050" dirty="0"/>
+          </a:p>
+        </p:txBody>
+      </p:sp>
+      <p:sp>
+        <p:nvSpPr>
+          <p:cNvPr id="15" name="Oval 14"/>
+          <p:cNvSpPr/>
+          <p:nvPr/>
+        </p:nvSpPr>
+        <p:spPr>
+          <a:xfrm>
+            <a:off x="7482001" y="212500"/>
+            <a:ext cx="924521" cy="749990"/>
+          </a:xfrm>
+          <a:prstGeom prst="ellipse">
+            <a:avLst/>
+          </a:prstGeom>
+          <a:solidFill>
+            <a:schemeClr val="tx2">
+              <a:lumMod val="40000"/>
+              <a:lumOff val="60000"/>
+            </a:schemeClr>
+          </a:solidFill>
+        </p:spPr>
+        <p:style>
+          <a:lnRef idx="2">
+            <a:schemeClr val="dk1"/>
+          </a:lnRef>
+          <a:fillRef idx="1">
+            <a:schemeClr val="lt1"/>
+          </a:fillRef>
+          <a:effectRef idx="0">
+            <a:schemeClr val="dk1"/>
+          </a:effectRef>
+          <a:fontRef idx="minor">
+            <a:schemeClr val="dk1"/>
+          </a:fontRef>
+        </p:style>
+        <p:txBody>
+          <a:bodyPr rtlCol="0" anchor="ctr"/>
+          <a:lstStyle/>
+          <a:p>
+            <a:pPr algn="ctr"/>
+            <a:r>
+              <a:rPr lang="en-US" sz="1050" dirty="0" err="1"/>
+              <a:t>Scikit</a:t>
+            </a:r>
+            <a:r>
+              <a:rPr lang="en-US" sz="1050" dirty="0"/>
+              <a:t>-Learn</a:t>
+            </a:r>
+          </a:p>
+        </p:txBody>
+      </p:sp>
+      <p:sp>
+        <p:nvSpPr>
+          <p:cNvPr id="16" name="Oval 15"/>
+          <p:cNvSpPr/>
+          <p:nvPr/>
+        </p:nvSpPr>
+        <p:spPr>
+          <a:xfrm>
+            <a:off x="6348275" y="48601"/>
+            <a:ext cx="924521" cy="749990"/>
+          </a:xfrm>
+          <a:prstGeom prst="ellipse">
+            <a:avLst/>
+          </a:prstGeom>
+          <a:solidFill>
+            <a:schemeClr val="tx2">
+              <a:lumMod val="40000"/>
+              <a:lumOff val="60000"/>
+            </a:schemeClr>
+          </a:solidFill>
+        </p:spPr>
+        <p:style>
+          <a:lnRef idx="2">
+            <a:schemeClr val="dk1"/>
+          </a:lnRef>
+          <a:fillRef idx="1">
+            <a:schemeClr val="lt1"/>
+          </a:fillRef>
+          <a:effectRef idx="0">
+            <a:schemeClr val="dk1"/>
+          </a:effectRef>
+          <a:fontRef idx="minor">
+            <a:schemeClr val="dk1"/>
+          </a:fontRef>
+        </p:style>
+        <p:txBody>
+          <a:bodyPr rtlCol="0" anchor="ctr"/>
+          <a:lstStyle/>
+          <a:p>
+            <a:pPr algn="ctr"/>
+            <a:r>
+              <a:rPr lang="en-US" sz="1050" dirty="0"/>
+              <a:t>NumPy</a:t>
+            </a:r>
+          </a:p>
+        </p:txBody>
+      </p:sp>
+      <p:sp>
+        <p:nvSpPr>
+          <p:cNvPr id="17" name="Oval 16"/>
+          <p:cNvSpPr/>
+          <p:nvPr/>
+        </p:nvSpPr>
+        <p:spPr>
+          <a:xfrm>
+            <a:off x="2467104" y="3999824"/>
+            <a:ext cx="1189134" cy="735983"/>
+          </a:xfrm>
+          <a:prstGeom prst="ellipse">
+            <a:avLst/>
+          </a:prstGeom>
+          <a:solidFill>
+            <a:schemeClr val="accent4">
+              <a:lumMod val="40000"/>
+              <a:lumOff val="60000"/>
+            </a:schemeClr>
+          </a:solidFill>
+        </p:spPr>
+        <p:style>
+          <a:lnRef idx="2">
+            <a:schemeClr val="dk1"/>
+          </a:lnRef>
+          <a:fillRef idx="1">
+            <a:schemeClr val="lt1"/>
+          </a:fillRef>
+          <a:effectRef idx="0">
+            <a:schemeClr val="dk1"/>
+          </a:effectRef>
+          <a:fontRef idx="minor">
+            <a:schemeClr val="dk1"/>
+          </a:fontRef>
+        </p:style>
+        <p:txBody>
+          <a:bodyPr rtlCol="0" anchor="ctr"/>
+          <a:lstStyle/>
+          <a:p>
+            <a:pPr algn="ctr"/>
+            <a:r>
+              <a:rPr lang="en-US" sz="1050" dirty="0">
+                <a:solidFill>
+                  <a:schemeClr val="tx1"/>
+                </a:solidFill>
+              </a:rPr>
+              <a:t>Trees </a:t>
+            </a:r>
+          </a:p>
+        </p:txBody>
+      </p:sp>
+      <p:sp>
+        <p:nvSpPr>
+          <p:cNvPr id="18" name="Oval 17"/>
+          <p:cNvSpPr/>
+          <p:nvPr/>
+        </p:nvSpPr>
+        <p:spPr>
+          <a:xfrm>
+            <a:off x="5085619" y="3967561"/>
+            <a:ext cx="1189134" cy="735983"/>
+          </a:xfrm>
+          <a:prstGeom prst="ellipse">
+            <a:avLst/>
+          </a:prstGeom>
+          <a:solidFill>
+            <a:schemeClr val="accent4">
+              <a:lumMod val="40000"/>
+              <a:lumOff val="60000"/>
+            </a:schemeClr>
+          </a:solidFill>
+          <a:ln>
+            <a:solidFill>
+              <a:schemeClr val="tx1">
+                <a:lumMod val="75000"/>
+                <a:lumOff val="25000"/>
+              </a:schemeClr>
+            </a:solidFill>
+          </a:ln>
+          <a:effectLst/>
+        </p:spPr>
+        <p:style>
+          <a:lnRef idx="2">
+            <a:schemeClr val="dk1"/>
+          </a:lnRef>
+          <a:fillRef idx="1">
+            <a:schemeClr val="lt1"/>
+          </a:fillRef>
+          <a:effectRef idx="0">
+            <a:schemeClr val="dk1"/>
+          </a:effectRef>
+          <a:fontRef idx="minor">
+            <a:schemeClr val="dk1"/>
+          </a:fontRef>
+        </p:style>
+        <p:txBody>
+          <a:bodyPr rtlCol="0" anchor="ctr"/>
+          <a:lstStyle/>
+          <a:p>
+            <a:pPr algn="ctr"/>
+            <a:r>
+              <a:rPr lang="en-US" sz="1050" dirty="0">
+                <a:solidFill>
+                  <a:schemeClr val="tx1"/>
+                </a:solidFill>
+              </a:rPr>
+              <a:t>Neural Networks </a:t>
+            </a:r>
+          </a:p>
+        </p:txBody>
+      </p:sp>
+      <p:cxnSp>
+        <p:nvCxnSpPr>
+          <p:cNvPr id="21" name="Straight Arrow Connector 20">
+            <a:extLst>
+              <a:ext uri="{FF2B5EF4-FFF2-40B4-BE49-F238E27FC236}">
+                <a16:creationId xmlns:a16="http://schemas.microsoft.com/office/drawing/2014/main" xmlns="" id="{6AD990E1-A7CA-0F4F-AF97-90CFC8B3CBD1}"/>
+              </a:ext>
+            </a:extLst>
+          </p:cNvPr>
+          <p:cNvCxnSpPr>
+            <a:stCxn id="4" idx="4"/>
+            <a:endCxn id="3" idx="0"/>
+          </p:cNvCxnSpPr>
+          <p:nvPr/>
+        </p:nvCxnSpPr>
+        <p:spPr>
+          <a:xfrm>
+            <a:off x="2578533" y="1693547"/>
+            <a:ext cx="482904" cy="642576"/>
+          </a:xfrm>
+          <a:prstGeom prst="straightConnector1">
+            <a:avLst/>
+          </a:prstGeom>
+          <a:ln>
+            <a:tailEnd type="triangle"/>
+          </a:ln>
+        </p:spPr>
+        <p:style>
+          <a:lnRef idx="2">
+            <a:schemeClr val="accent1"/>
+          </a:lnRef>
+          <a:fillRef idx="0">
+            <a:schemeClr val="accent1"/>
+          </a:fillRef>
+          <a:effectRef idx="1">
+            <a:schemeClr val="accent1"/>
+          </a:effectRef>
+          <a:fontRef idx="minor">
+            <a:schemeClr val="tx1"/>
+          </a:fontRef>
+        </p:style>
+      </p:cxnSp>
+      <p:cxnSp>
+        <p:nvCxnSpPr>
+          <p:cNvPr id="23" name="Straight Arrow Connector 22">
+            <a:extLst>
+              <a:ext uri="{FF2B5EF4-FFF2-40B4-BE49-F238E27FC236}">
+                <a16:creationId xmlns:a16="http://schemas.microsoft.com/office/drawing/2014/main" xmlns="" id="{B16F65D8-F975-9C45-9593-5CAD330BB5F3}"/>
+              </a:ext>
+            </a:extLst>
+          </p:cNvPr>
+          <p:cNvCxnSpPr>
+            <a:cxnSpLocks/>
+            <a:stCxn id="9" idx="7"/>
+            <a:endCxn id="4" idx="2"/>
+          </p:cNvCxnSpPr>
+          <p:nvPr/>
+        </p:nvCxnSpPr>
+        <p:spPr>
+          <a:xfrm flipV="1">
+            <a:off x="1475159" y="1365888"/>
+            <a:ext cx="315845" cy="46859"/>
+          </a:xfrm>
+          <a:prstGeom prst="straightConnector1">
+            <a:avLst/>
+          </a:prstGeom>
+          <a:ln>
+            <a:solidFill>
+              <a:schemeClr val="accent1"/>
+            </a:solidFill>
+            <a:prstDash val="sysDot"/>
+            <a:tailEnd type="triangle"/>
+          </a:ln>
+        </p:spPr>
+        <p:style>
+          <a:lnRef idx="2">
+            <a:schemeClr val="accent1"/>
+          </a:lnRef>
+          <a:fillRef idx="0">
+            <a:schemeClr val="accent1"/>
+          </a:fillRef>
+          <a:effectRef idx="1">
+            <a:schemeClr val="accent1"/>
+          </a:effectRef>
+          <a:fontRef idx="minor">
+            <a:schemeClr val="tx1"/>
+          </a:fontRef>
+        </p:style>
+      </p:cxnSp>
+      <p:cxnSp>
+        <p:nvCxnSpPr>
+          <p:cNvPr id="49" name="Straight Arrow Connector 48">
+            <a:extLst>
+              <a:ext uri="{FF2B5EF4-FFF2-40B4-BE49-F238E27FC236}">
+                <a16:creationId xmlns:a16="http://schemas.microsoft.com/office/drawing/2014/main" xmlns="" id="{6F8215BB-1081-BF48-9C2C-8CDC7EB1BC8E}"/>
+              </a:ext>
+            </a:extLst>
+          </p:cNvPr>
+          <p:cNvCxnSpPr>
+            <a:stCxn id="5" idx="5"/>
+            <a:endCxn id="4" idx="1"/>
+          </p:cNvCxnSpPr>
+          <p:nvPr/>
+        </p:nvCxnSpPr>
+        <p:spPr>
+          <a:xfrm>
+            <a:off x="1460887" y="956543"/>
+            <a:ext cx="560779" cy="177654"/>
+          </a:xfrm>
+          <a:prstGeom prst="straightConnector1">
+            <a:avLst/>
+          </a:prstGeom>
+          <a:ln>
+            <a:tailEnd type="triangle"/>
+          </a:ln>
+        </p:spPr>
+        <p:style>
+          <a:lnRef idx="2">
+            <a:schemeClr val="accent1"/>
+          </a:lnRef>
+          <a:fillRef idx="0">
+            <a:schemeClr val="accent1"/>
+          </a:fillRef>
+          <a:effectRef idx="1">
+            <a:schemeClr val="accent1"/>
+          </a:effectRef>
+          <a:fontRef idx="minor">
+            <a:schemeClr val="tx1"/>
+          </a:fontRef>
+        </p:style>
+      </p:cxnSp>
+      <p:cxnSp>
+        <p:nvCxnSpPr>
+          <p:cNvPr id="122" name="Straight Arrow Connector 121">
+            <a:extLst>
+              <a:ext uri="{FF2B5EF4-FFF2-40B4-BE49-F238E27FC236}">
+                <a16:creationId xmlns:a16="http://schemas.microsoft.com/office/drawing/2014/main" xmlns="" id="{B939EBDE-7FA4-A541-B7A1-6336F218904F}"/>
+              </a:ext>
+            </a:extLst>
+          </p:cNvPr>
+          <p:cNvCxnSpPr>
+            <a:cxnSpLocks/>
+            <a:stCxn id="4" idx="5"/>
+            <a:endCxn id="11" idx="1"/>
+          </p:cNvCxnSpPr>
+          <p:nvPr/>
+        </p:nvCxnSpPr>
+        <p:spPr>
+          <a:xfrm>
+            <a:off x="3135400" y="1597578"/>
+            <a:ext cx="1949985" cy="890433"/>
+          </a:xfrm>
+          <a:prstGeom prst="straightConnector1">
+            <a:avLst/>
+          </a:prstGeom>
+          <a:ln>
+            <a:tailEnd type="triangle"/>
+          </a:ln>
+        </p:spPr>
+        <p:style>
+          <a:lnRef idx="2">
+            <a:schemeClr val="accent1"/>
+          </a:lnRef>
+          <a:fillRef idx="0">
+            <a:schemeClr val="accent1"/>
+          </a:fillRef>
+          <a:effectRef idx="1">
+            <a:schemeClr val="accent1"/>
+          </a:effectRef>
+          <a:fontRef idx="minor">
+            <a:schemeClr val="tx1"/>
+          </a:fontRef>
+        </p:style>
+      </p:cxnSp>
+      <p:sp>
+        <p:nvSpPr>
+          <p:cNvPr id="125" name="Oval 124">
+            <a:extLst>
+              <a:ext uri="{FF2B5EF4-FFF2-40B4-BE49-F238E27FC236}">
+                <a16:creationId xmlns:a16="http://schemas.microsoft.com/office/drawing/2014/main" xmlns="" id="{0A38CC41-BBC0-1A45-8387-073322E012D7}"/>
+              </a:ext>
+            </a:extLst>
+          </p:cNvPr>
+          <p:cNvSpPr/>
+          <p:nvPr/>
+        </p:nvSpPr>
+        <p:spPr>
+          <a:xfrm>
+            <a:off x="6048209" y="1045370"/>
+            <a:ext cx="1381468" cy="820822"/>
+          </a:xfrm>
+          <a:prstGeom prst="ellipse">
+            <a:avLst/>
+          </a:prstGeom>
+          <a:solidFill>
+            <a:schemeClr val="tx2">
+              <a:lumMod val="40000"/>
+              <a:lumOff val="60000"/>
+            </a:schemeClr>
+          </a:solidFill>
+        </p:spPr>
+        <p:style>
+          <a:lnRef idx="2">
+            <a:schemeClr val="dk1"/>
+          </a:lnRef>
+          <a:fillRef idx="1">
+            <a:schemeClr val="lt1"/>
+          </a:fillRef>
+          <a:effectRef idx="0">
+            <a:schemeClr val="dk1"/>
+          </a:effectRef>
+          <a:fontRef idx="minor">
+            <a:schemeClr val="dk1"/>
+          </a:fontRef>
+        </p:style>
+        <p:txBody>
+          <a:bodyPr rtlCol="0" anchor="ctr"/>
+          <a:lstStyle/>
+          <a:p>
+            <a:pPr algn="ctr"/>
+            <a:r>
+              <a:rPr lang="en-US" sz="1050" b="1" dirty="0"/>
+              <a:t>Computing Tools</a:t>
+            </a:r>
+          </a:p>
+        </p:txBody>
+      </p:sp>
+      <p:cxnSp>
+        <p:nvCxnSpPr>
+          <p:cNvPr id="146" name="Straight Arrow Connector 145">
+            <a:extLst>
+              <a:ext uri="{FF2B5EF4-FFF2-40B4-BE49-F238E27FC236}">
+                <a16:creationId xmlns:a16="http://schemas.microsoft.com/office/drawing/2014/main" xmlns="" id="{FB03051D-FEF4-B940-AB8B-AF6588B32FE1}"/>
+              </a:ext>
+            </a:extLst>
+          </p:cNvPr>
+          <p:cNvCxnSpPr>
+            <a:cxnSpLocks/>
+            <a:stCxn id="125" idx="4"/>
+            <a:endCxn id="11" idx="7"/>
+          </p:cNvCxnSpPr>
+          <p:nvPr/>
+        </p:nvCxnSpPr>
+        <p:spPr>
+          <a:xfrm flipH="1">
+            <a:off x="6274987" y="1866192"/>
+            <a:ext cx="463956" cy="621820"/>
+          </a:xfrm>
+          <a:prstGeom prst="straightConnector1">
+            <a:avLst/>
+          </a:prstGeom>
+          <a:ln>
+            <a:tailEnd type="triangle"/>
+          </a:ln>
+        </p:spPr>
+        <p:style>
+          <a:lnRef idx="2">
+            <a:schemeClr val="accent1"/>
+          </a:lnRef>
+          <a:fillRef idx="0">
+            <a:schemeClr val="accent1"/>
+          </a:fillRef>
+          <a:effectRef idx="1">
+            <a:schemeClr val="accent1"/>
+          </a:effectRef>
+          <a:fontRef idx="minor">
+            <a:schemeClr val="tx1"/>
+          </a:fontRef>
+        </p:style>
+      </p:cxnSp>
+      <p:cxnSp>
+        <p:nvCxnSpPr>
+          <p:cNvPr id="149" name="Straight Arrow Connector 148">
+            <a:extLst>
+              <a:ext uri="{FF2B5EF4-FFF2-40B4-BE49-F238E27FC236}">
+                <a16:creationId xmlns:a16="http://schemas.microsoft.com/office/drawing/2014/main" xmlns="" id="{BB4F7C73-0600-E04A-AF6F-3A111757D58B}"/>
+              </a:ext>
+            </a:extLst>
+          </p:cNvPr>
+          <p:cNvCxnSpPr>
+            <a:cxnSpLocks/>
+            <a:stCxn id="125" idx="3"/>
+            <a:endCxn id="3" idx="7"/>
+          </p:cNvCxnSpPr>
+          <p:nvPr/>
+        </p:nvCxnSpPr>
+        <p:spPr>
+          <a:xfrm flipH="1">
+            <a:off x="3656238" y="1745986"/>
+            <a:ext cx="2594282" cy="731372"/>
+          </a:xfrm>
+          <a:prstGeom prst="straightConnector1">
+            <a:avLst/>
+          </a:prstGeom>
+          <a:ln>
+            <a:tailEnd type="triangle"/>
+          </a:ln>
+        </p:spPr>
+        <p:style>
+          <a:lnRef idx="2">
+            <a:schemeClr val="accent1"/>
+          </a:lnRef>
+          <a:fillRef idx="0">
+            <a:schemeClr val="accent1"/>
+          </a:fillRef>
+          <a:effectRef idx="1">
+            <a:schemeClr val="accent1"/>
+          </a:effectRef>
+          <a:fontRef idx="minor">
+            <a:schemeClr val="tx1"/>
+          </a:fontRef>
+        </p:style>
+      </p:cxnSp>
+      <p:cxnSp>
+        <p:nvCxnSpPr>
+          <p:cNvPr id="152" name="Straight Arrow Connector 151">
+            <a:extLst>
+              <a:ext uri="{FF2B5EF4-FFF2-40B4-BE49-F238E27FC236}">
+                <a16:creationId xmlns:a16="http://schemas.microsoft.com/office/drawing/2014/main" xmlns="" id="{9CB367A1-32AB-F74A-B554-7059449FADB0}"/>
+              </a:ext>
+            </a:extLst>
+          </p:cNvPr>
+          <p:cNvCxnSpPr>
+            <a:cxnSpLocks/>
+            <a:stCxn id="6" idx="4"/>
+            <a:endCxn id="4" idx="0"/>
+          </p:cNvCxnSpPr>
+          <p:nvPr/>
+        </p:nvCxnSpPr>
+        <p:spPr>
+          <a:xfrm>
+            <a:off x="2339212" y="744040"/>
+            <a:ext cx="239321" cy="294188"/>
+          </a:xfrm>
+          <a:prstGeom prst="straightConnector1">
+            <a:avLst/>
+          </a:prstGeom>
+          <a:ln>
+            <a:tailEnd type="triangle"/>
+          </a:ln>
+        </p:spPr>
+        <p:style>
+          <a:lnRef idx="2">
+            <a:schemeClr val="accent1"/>
+          </a:lnRef>
+          <a:fillRef idx="0">
+            <a:schemeClr val="accent1"/>
+          </a:fillRef>
+          <a:effectRef idx="1">
+            <a:schemeClr val="accent1"/>
+          </a:effectRef>
+          <a:fontRef idx="minor">
+            <a:schemeClr val="tx1"/>
+          </a:fontRef>
+        </p:style>
+      </p:cxnSp>
+      <p:cxnSp>
+        <p:nvCxnSpPr>
+          <p:cNvPr id="153" name="Straight Arrow Connector 152">
+            <a:extLst>
+              <a:ext uri="{FF2B5EF4-FFF2-40B4-BE49-F238E27FC236}">
+                <a16:creationId xmlns:a16="http://schemas.microsoft.com/office/drawing/2014/main" xmlns="" id="{2408E805-EEE6-7F43-8E85-F4F6D7B857C4}"/>
+              </a:ext>
+            </a:extLst>
+          </p:cNvPr>
+          <p:cNvCxnSpPr>
+            <a:cxnSpLocks/>
+            <a:stCxn id="8" idx="3"/>
+            <a:endCxn id="4" idx="7"/>
+          </p:cNvCxnSpPr>
+          <p:nvPr/>
+        </p:nvCxnSpPr>
+        <p:spPr>
+          <a:xfrm flipH="1">
+            <a:off x="3135400" y="701834"/>
+            <a:ext cx="64913" cy="432363"/>
+          </a:xfrm>
+          <a:prstGeom prst="straightConnector1">
+            <a:avLst/>
+          </a:prstGeom>
+          <a:ln>
+            <a:tailEnd type="triangle"/>
+          </a:ln>
+        </p:spPr>
+        <p:style>
+          <a:lnRef idx="2">
+            <a:schemeClr val="accent1"/>
+          </a:lnRef>
+          <a:fillRef idx="0">
+            <a:schemeClr val="accent1"/>
+          </a:fillRef>
+          <a:effectRef idx="1">
+            <a:schemeClr val="accent1"/>
+          </a:effectRef>
+          <a:fontRef idx="minor">
+            <a:schemeClr val="tx1"/>
+          </a:fontRef>
+        </p:style>
+      </p:cxnSp>
+      <p:cxnSp>
+        <p:nvCxnSpPr>
+          <p:cNvPr id="154" name="Straight Arrow Connector 153">
+            <a:extLst>
+              <a:ext uri="{FF2B5EF4-FFF2-40B4-BE49-F238E27FC236}">
+                <a16:creationId xmlns:a16="http://schemas.microsoft.com/office/drawing/2014/main" xmlns="" id="{22BE1F98-14F0-BD4F-8974-3A2C438F7347}"/>
+              </a:ext>
+            </a:extLst>
+          </p:cNvPr>
+          <p:cNvCxnSpPr>
+            <a:cxnSpLocks/>
+            <a:stCxn id="12" idx="2"/>
+            <a:endCxn id="4" idx="6"/>
+          </p:cNvCxnSpPr>
+          <p:nvPr/>
+        </p:nvCxnSpPr>
+        <p:spPr>
+          <a:xfrm flipH="1">
+            <a:off x="3366061" y="1254703"/>
+            <a:ext cx="265097" cy="111185"/>
+          </a:xfrm>
+          <a:prstGeom prst="straightConnector1">
+            <a:avLst/>
+          </a:prstGeom>
+          <a:ln>
+            <a:tailEnd type="triangle"/>
+          </a:ln>
+        </p:spPr>
+        <p:style>
+          <a:lnRef idx="2">
+            <a:schemeClr val="accent1"/>
+          </a:lnRef>
+          <a:fillRef idx="0">
+            <a:schemeClr val="accent1"/>
+          </a:fillRef>
+          <a:effectRef idx="1">
+            <a:schemeClr val="accent1"/>
+          </a:effectRef>
+          <a:fontRef idx="minor">
+            <a:schemeClr val="tx1"/>
+          </a:fontRef>
+        </p:style>
+      </p:cxnSp>
+      <p:cxnSp>
+        <p:nvCxnSpPr>
+          <p:cNvPr id="174" name="Straight Arrow Connector 173">
+            <a:extLst>
+              <a:ext uri="{FF2B5EF4-FFF2-40B4-BE49-F238E27FC236}">
+                <a16:creationId xmlns:a16="http://schemas.microsoft.com/office/drawing/2014/main" xmlns="" id="{43DE0FB5-605B-2442-BDB4-500DA3357F55}"/>
+              </a:ext>
+            </a:extLst>
+          </p:cNvPr>
+          <p:cNvCxnSpPr>
+            <a:cxnSpLocks/>
+            <a:stCxn id="13" idx="5"/>
+            <a:endCxn id="125" idx="1"/>
+          </p:cNvCxnSpPr>
+          <p:nvPr/>
+        </p:nvCxnSpPr>
+        <p:spPr>
+          <a:xfrm>
+            <a:off x="6036687" y="727305"/>
+            <a:ext cx="213833" cy="438271"/>
+          </a:xfrm>
+          <a:prstGeom prst="straightConnector1">
+            <a:avLst/>
+          </a:prstGeom>
+          <a:ln>
+            <a:tailEnd type="triangle"/>
+          </a:ln>
+        </p:spPr>
+        <p:style>
+          <a:lnRef idx="2">
+            <a:schemeClr val="accent1"/>
+          </a:lnRef>
+          <a:fillRef idx="0">
+            <a:schemeClr val="accent1"/>
+          </a:fillRef>
+          <a:effectRef idx="1">
+            <a:schemeClr val="accent1"/>
+          </a:effectRef>
+          <a:fontRef idx="minor">
+            <a:schemeClr val="tx1"/>
+          </a:fontRef>
+        </p:style>
+      </p:cxnSp>
+      <p:cxnSp>
+        <p:nvCxnSpPr>
+          <p:cNvPr id="175" name="Straight Arrow Connector 174">
+            <a:extLst>
+              <a:ext uri="{FF2B5EF4-FFF2-40B4-BE49-F238E27FC236}">
+                <a16:creationId xmlns:a16="http://schemas.microsoft.com/office/drawing/2014/main" xmlns="" id="{766B88F7-4A2B-604B-B9CF-75C53F53BF8C}"/>
+              </a:ext>
+            </a:extLst>
+          </p:cNvPr>
+          <p:cNvCxnSpPr>
+            <a:cxnSpLocks/>
+            <a:stCxn id="16" idx="4"/>
+            <a:endCxn id="125" idx="0"/>
+          </p:cNvCxnSpPr>
+          <p:nvPr/>
+        </p:nvCxnSpPr>
+        <p:spPr>
+          <a:xfrm flipH="1">
+            <a:off x="6738943" y="798591"/>
+            <a:ext cx="71593" cy="246779"/>
+          </a:xfrm>
+          <a:prstGeom prst="straightConnector1">
+            <a:avLst/>
+          </a:prstGeom>
+          <a:ln>
+            <a:tailEnd type="triangle"/>
+          </a:ln>
+        </p:spPr>
+        <p:style>
+          <a:lnRef idx="2">
+            <a:schemeClr val="accent1"/>
+          </a:lnRef>
+          <a:fillRef idx="0">
+            <a:schemeClr val="accent1"/>
+          </a:fillRef>
+          <a:effectRef idx="1">
+            <a:schemeClr val="accent1"/>
+          </a:effectRef>
+          <a:fontRef idx="minor">
+            <a:schemeClr val="tx1"/>
+          </a:fontRef>
+        </p:style>
+      </p:cxnSp>
+      <p:cxnSp>
+        <p:nvCxnSpPr>
+          <p:cNvPr id="176" name="Straight Arrow Connector 175">
+            <a:extLst>
+              <a:ext uri="{FF2B5EF4-FFF2-40B4-BE49-F238E27FC236}">
+                <a16:creationId xmlns:a16="http://schemas.microsoft.com/office/drawing/2014/main" xmlns="" id="{1C180F75-A22F-E249-AAE3-A299EE4957A2}"/>
+              </a:ext>
+            </a:extLst>
+          </p:cNvPr>
+          <p:cNvCxnSpPr>
+            <a:cxnSpLocks/>
+            <a:stCxn id="15" idx="3"/>
+            <a:endCxn id="125" idx="7"/>
+          </p:cNvCxnSpPr>
+          <p:nvPr/>
+        </p:nvCxnSpPr>
+        <p:spPr>
+          <a:xfrm flipH="1">
+            <a:off x="7227365" y="852656"/>
+            <a:ext cx="390029" cy="312920"/>
+          </a:xfrm>
+          <a:prstGeom prst="straightConnector1">
+            <a:avLst/>
+          </a:prstGeom>
+          <a:ln>
+            <a:tailEnd type="triangle"/>
+          </a:ln>
+        </p:spPr>
+        <p:style>
+          <a:lnRef idx="2">
+            <a:schemeClr val="accent1"/>
+          </a:lnRef>
+          <a:fillRef idx="0">
+            <a:schemeClr val="accent1"/>
+          </a:fillRef>
+          <a:effectRef idx="1">
+            <a:schemeClr val="accent1"/>
+          </a:effectRef>
+          <a:fontRef idx="minor">
+            <a:schemeClr val="tx1"/>
+          </a:fontRef>
+        </p:style>
+      </p:cxnSp>
+      <p:cxnSp>
+        <p:nvCxnSpPr>
+          <p:cNvPr id="177" name="Straight Arrow Connector 176">
+            <a:extLst>
+              <a:ext uri="{FF2B5EF4-FFF2-40B4-BE49-F238E27FC236}">
+                <a16:creationId xmlns:a16="http://schemas.microsoft.com/office/drawing/2014/main" xmlns="" id="{82C77B47-028A-584D-B335-E5B391079A1A}"/>
+              </a:ext>
+            </a:extLst>
+          </p:cNvPr>
+          <p:cNvCxnSpPr>
+            <a:cxnSpLocks/>
+            <a:stCxn id="14" idx="2"/>
+            <a:endCxn id="125" idx="6"/>
+          </p:cNvCxnSpPr>
+          <p:nvPr/>
+        </p:nvCxnSpPr>
+        <p:spPr>
+          <a:xfrm flipH="1">
+            <a:off x="7429676" y="1455780"/>
+            <a:ext cx="329943" cy="1"/>
+          </a:xfrm>
+          <a:prstGeom prst="straightConnector1">
+            <a:avLst/>
+          </a:prstGeom>
+          <a:ln>
+            <a:tailEnd type="triangle"/>
+          </a:ln>
+        </p:spPr>
+        <p:style>
+          <a:lnRef idx="2">
+            <a:schemeClr val="accent1"/>
+          </a:lnRef>
+          <a:fillRef idx="0">
+            <a:schemeClr val="accent1"/>
+          </a:fillRef>
+          <a:effectRef idx="1">
+            <a:schemeClr val="accent1"/>
+          </a:effectRef>
+          <a:fontRef idx="minor">
+            <a:schemeClr val="tx1"/>
+          </a:fontRef>
+        </p:style>
+      </p:cxnSp>
+      <p:sp>
+        <p:nvSpPr>
+          <p:cNvPr id="220" name="Oval 219">
+            <a:extLst>
+              <a:ext uri="{FF2B5EF4-FFF2-40B4-BE49-F238E27FC236}">
+                <a16:creationId xmlns:a16="http://schemas.microsoft.com/office/drawing/2014/main" xmlns="" id="{AC00FAD6-E7F4-5642-AB25-35E9AFF332EA}"/>
+              </a:ext>
+            </a:extLst>
+          </p:cNvPr>
+          <p:cNvSpPr/>
+          <p:nvPr/>
+        </p:nvSpPr>
+        <p:spPr>
+          <a:xfrm>
+            <a:off x="307419" y="2794948"/>
+            <a:ext cx="1200328" cy="827657"/>
+          </a:xfrm>
+          <a:prstGeom prst="ellipse">
+            <a:avLst/>
+          </a:prstGeom>
+          <a:solidFill>
+            <a:schemeClr val="accent2">
+              <a:lumMod val="40000"/>
+              <a:lumOff val="60000"/>
+            </a:schemeClr>
+          </a:solidFill>
+        </p:spPr>
+        <p:style>
+          <a:lnRef idx="2">
+            <a:schemeClr val="dk1"/>
+          </a:lnRef>
+          <a:fillRef idx="1">
+            <a:schemeClr val="lt1"/>
+          </a:fillRef>
+          <a:effectRef idx="0">
+            <a:schemeClr val="dk1"/>
+          </a:effectRef>
+          <a:fontRef idx="minor">
+            <a:schemeClr val="dk1"/>
+          </a:fontRef>
+        </p:style>
+        <p:txBody>
+          <a:bodyPr rtlCol="0" anchor="ctr"/>
+          <a:lstStyle/>
+          <a:p>
+            <a:pPr algn="ctr"/>
+            <a:r>
+              <a:rPr lang="en-US" sz="1050" dirty="0">
+                <a:solidFill>
+                  <a:schemeClr val="tx1"/>
+                </a:solidFill>
+              </a:rPr>
+              <a:t>Linear </a:t>
+            </a:r>
+          </a:p>
+        </p:txBody>
+      </p:sp>
+      <p:sp>
+        <p:nvSpPr>
+          <p:cNvPr id="221" name="Oval 220">
+            <a:extLst>
+              <a:ext uri="{FF2B5EF4-FFF2-40B4-BE49-F238E27FC236}">
+                <a16:creationId xmlns:a16="http://schemas.microsoft.com/office/drawing/2014/main" xmlns="" id="{242E7FCE-20B3-3A49-A454-D07B9E5796CC}"/>
+              </a:ext>
+            </a:extLst>
+          </p:cNvPr>
+          <p:cNvSpPr/>
+          <p:nvPr/>
+        </p:nvSpPr>
+        <p:spPr>
+          <a:xfrm>
+            <a:off x="3773015" y="3982467"/>
+            <a:ext cx="1189134" cy="735983"/>
+          </a:xfrm>
+          <a:prstGeom prst="ellipse">
+            <a:avLst/>
+          </a:prstGeom>
+          <a:solidFill>
+            <a:schemeClr val="accent4">
+              <a:lumMod val="40000"/>
+              <a:lumOff val="60000"/>
+            </a:schemeClr>
+          </a:solidFill>
+        </p:spPr>
+        <p:style>
+          <a:lnRef idx="2">
+            <a:schemeClr val="dk1"/>
+          </a:lnRef>
+          <a:fillRef idx="1">
+            <a:schemeClr val="lt1"/>
+          </a:fillRef>
+          <a:effectRef idx="0">
+            <a:schemeClr val="dk1"/>
+          </a:effectRef>
+          <a:fontRef idx="minor">
+            <a:schemeClr val="dk1"/>
+          </a:fontRef>
+        </p:style>
+        <p:txBody>
+          <a:bodyPr rtlCol="0" anchor="ctr"/>
+          <a:lstStyle/>
+          <a:p>
+            <a:pPr algn="ctr"/>
+            <a:r>
+              <a:rPr lang="en-US" sz="1050" dirty="0">
+                <a:solidFill>
+                  <a:schemeClr val="tx1"/>
+                </a:solidFill>
+              </a:rPr>
+              <a:t>KNN </a:t>
+            </a:r>
+          </a:p>
+        </p:txBody>
+      </p:sp>
+      <p:sp>
+        <p:nvSpPr>
+          <p:cNvPr id="222" name="Oval 221">
+            <a:extLst>
+              <a:ext uri="{FF2B5EF4-FFF2-40B4-BE49-F238E27FC236}">
+                <a16:creationId xmlns:a16="http://schemas.microsoft.com/office/drawing/2014/main" xmlns="" id="{279C588F-2091-2C49-AA4D-B0C13FDE728A}"/>
+              </a:ext>
+            </a:extLst>
+          </p:cNvPr>
+          <p:cNvSpPr/>
+          <p:nvPr/>
+        </p:nvSpPr>
+        <p:spPr>
+          <a:xfrm>
+            <a:off x="7081851" y="2415151"/>
+            <a:ext cx="1189134" cy="827657"/>
+          </a:xfrm>
+          <a:prstGeom prst="ellipse">
+            <a:avLst/>
+          </a:prstGeom>
+          <a:solidFill>
+            <a:schemeClr val="accent3">
+              <a:lumMod val="60000"/>
+              <a:lumOff val="40000"/>
+            </a:schemeClr>
+          </a:solidFill>
+        </p:spPr>
+        <p:style>
+          <a:lnRef idx="2">
+            <a:schemeClr val="dk1"/>
+          </a:lnRef>
+          <a:fillRef idx="1">
+            <a:schemeClr val="lt1"/>
+          </a:fillRef>
+          <a:effectRef idx="0">
+            <a:schemeClr val="dk1"/>
+          </a:effectRef>
+          <a:fontRef idx="minor">
+            <a:schemeClr val="dk1"/>
+          </a:fontRef>
+        </p:style>
+        <p:txBody>
+          <a:bodyPr rtlCol="0" anchor="ctr"/>
+          <a:lstStyle/>
+          <a:p>
+            <a:pPr algn="ctr"/>
+            <a:r>
+              <a:rPr lang="en-US" sz="1050" dirty="0">
+                <a:solidFill>
+                  <a:schemeClr val="tx1"/>
+                </a:solidFill>
+              </a:rPr>
+              <a:t>Logistic </a:t>
+            </a:r>
+          </a:p>
+        </p:txBody>
+      </p:sp>
+      <p:cxnSp>
+        <p:nvCxnSpPr>
+          <p:cNvPr id="230" name="Straight Arrow Connector 229">
+            <a:extLst>
+              <a:ext uri="{FF2B5EF4-FFF2-40B4-BE49-F238E27FC236}">
+                <a16:creationId xmlns:a16="http://schemas.microsoft.com/office/drawing/2014/main" xmlns="" id="{E798F050-3D80-0449-A709-BAF8D89C828C}"/>
+              </a:ext>
+            </a:extLst>
+          </p:cNvPr>
+          <p:cNvCxnSpPr>
+            <a:cxnSpLocks/>
+            <a:stCxn id="220" idx="0"/>
+            <a:endCxn id="9" idx="4"/>
+          </p:cNvCxnSpPr>
+          <p:nvPr/>
+        </p:nvCxnSpPr>
+        <p:spPr>
+          <a:xfrm flipH="1" flipV="1">
+            <a:off x="873015" y="2346777"/>
+            <a:ext cx="34568" cy="448171"/>
+          </a:xfrm>
+          <a:prstGeom prst="straightConnector1">
+            <a:avLst/>
+          </a:prstGeom>
+          <a:ln>
+            <a:tailEnd type="triangle"/>
+          </a:ln>
+        </p:spPr>
+        <p:style>
+          <a:lnRef idx="2">
+            <a:schemeClr val="accent1"/>
+          </a:lnRef>
+          <a:fillRef idx="0">
+            <a:schemeClr val="accent1"/>
+          </a:fillRef>
+          <a:effectRef idx="1">
+            <a:schemeClr val="accent1"/>
+          </a:effectRef>
+          <a:fontRef idx="minor">
+            <a:schemeClr val="tx1"/>
+          </a:fontRef>
+        </p:style>
+      </p:cxnSp>
+      <p:cxnSp>
+        <p:nvCxnSpPr>
+          <p:cNvPr id="232" name="Straight Arrow Connector 231">
+            <a:extLst>
+              <a:ext uri="{FF2B5EF4-FFF2-40B4-BE49-F238E27FC236}">
+                <a16:creationId xmlns:a16="http://schemas.microsoft.com/office/drawing/2014/main" xmlns="" id="{C5DD9D26-F6BF-584F-840E-CDD9CCC813A6}"/>
+              </a:ext>
+            </a:extLst>
+          </p:cNvPr>
+          <p:cNvCxnSpPr>
+            <a:cxnSpLocks/>
+            <a:stCxn id="220" idx="7"/>
+            <a:endCxn id="3" idx="2"/>
+          </p:cNvCxnSpPr>
+          <p:nvPr/>
+        </p:nvCxnSpPr>
+        <p:spPr>
+          <a:xfrm flipV="1">
+            <a:off x="1331962" y="2818327"/>
+            <a:ext cx="888299" cy="97829"/>
+          </a:xfrm>
+          <a:prstGeom prst="straightConnector1">
+            <a:avLst/>
+          </a:prstGeom>
+          <a:ln>
+            <a:tailEnd type="triangle"/>
+          </a:ln>
+        </p:spPr>
+        <p:style>
+          <a:lnRef idx="2">
+            <a:schemeClr val="accent1"/>
+          </a:lnRef>
+          <a:fillRef idx="0">
+            <a:schemeClr val="accent1"/>
+          </a:fillRef>
+          <a:effectRef idx="1">
+            <a:schemeClr val="accent1"/>
+          </a:effectRef>
+          <a:fontRef idx="minor">
+            <a:schemeClr val="tx1"/>
+          </a:fontRef>
+        </p:style>
+      </p:cxnSp>
+      <p:cxnSp>
+        <p:nvCxnSpPr>
+          <p:cNvPr id="234" name="Straight Arrow Connector 233">
+            <a:extLst>
+              <a:ext uri="{FF2B5EF4-FFF2-40B4-BE49-F238E27FC236}">
+                <a16:creationId xmlns:a16="http://schemas.microsoft.com/office/drawing/2014/main" xmlns="" id="{B4A4C60D-47A0-2040-8F30-F918152A8D73}"/>
+              </a:ext>
+            </a:extLst>
+          </p:cNvPr>
+          <p:cNvCxnSpPr>
+            <a:stCxn id="17" idx="0"/>
+            <a:endCxn id="3" idx="4"/>
+          </p:cNvCxnSpPr>
+          <p:nvPr/>
+        </p:nvCxnSpPr>
+        <p:spPr>
+          <a:xfrm flipH="1" flipV="1">
+            <a:off x="3061437" y="3300530"/>
+            <a:ext cx="234" cy="699294"/>
+          </a:xfrm>
+          <a:prstGeom prst="straightConnector1">
+            <a:avLst/>
+          </a:prstGeom>
+          <a:ln>
+            <a:tailEnd type="triangle"/>
+          </a:ln>
+        </p:spPr>
+        <p:style>
+          <a:lnRef idx="2">
+            <a:schemeClr val="accent1"/>
+          </a:lnRef>
+          <a:fillRef idx="0">
+            <a:schemeClr val="accent1"/>
+          </a:fillRef>
+          <a:effectRef idx="1">
+            <a:schemeClr val="accent1"/>
+          </a:effectRef>
+          <a:fontRef idx="minor">
+            <a:schemeClr val="tx1"/>
+          </a:fontRef>
+        </p:style>
+      </p:cxnSp>
+      <p:cxnSp>
+        <p:nvCxnSpPr>
+          <p:cNvPr id="236" name="Straight Arrow Connector 235">
+            <a:extLst>
+              <a:ext uri="{FF2B5EF4-FFF2-40B4-BE49-F238E27FC236}">
+                <a16:creationId xmlns:a16="http://schemas.microsoft.com/office/drawing/2014/main" xmlns="" id="{79970806-C7F1-2245-8871-4BD27304C1FE}"/>
+              </a:ext>
+            </a:extLst>
+          </p:cNvPr>
+          <p:cNvCxnSpPr>
+            <a:stCxn id="17" idx="0"/>
+            <a:endCxn id="11" idx="3"/>
+          </p:cNvCxnSpPr>
+          <p:nvPr/>
+        </p:nvCxnSpPr>
+        <p:spPr>
+          <a:xfrm flipV="1">
+            <a:off x="3061671" y="3169949"/>
+            <a:ext cx="2023714" cy="829875"/>
+          </a:xfrm>
+          <a:prstGeom prst="straightConnector1">
+            <a:avLst/>
+          </a:prstGeom>
+          <a:ln>
+            <a:tailEnd type="triangle"/>
+          </a:ln>
+        </p:spPr>
+        <p:style>
+          <a:lnRef idx="2">
+            <a:schemeClr val="accent1"/>
+          </a:lnRef>
+          <a:fillRef idx="0">
+            <a:schemeClr val="accent1"/>
+          </a:fillRef>
+          <a:effectRef idx="1">
+            <a:schemeClr val="accent1"/>
+          </a:effectRef>
+          <a:fontRef idx="minor">
+            <a:schemeClr val="tx1"/>
+          </a:fontRef>
+        </p:style>
+      </p:cxnSp>
+      <p:cxnSp>
+        <p:nvCxnSpPr>
+          <p:cNvPr id="238" name="Straight Arrow Connector 237">
+            <a:extLst>
+              <a:ext uri="{FF2B5EF4-FFF2-40B4-BE49-F238E27FC236}">
+                <a16:creationId xmlns:a16="http://schemas.microsoft.com/office/drawing/2014/main" xmlns="" id="{B44BE0E3-38AC-4C43-B6F4-2E75051378F2}"/>
+              </a:ext>
+            </a:extLst>
+          </p:cNvPr>
+          <p:cNvCxnSpPr>
+            <a:stCxn id="221" idx="0"/>
+            <a:endCxn id="3" idx="5"/>
+          </p:cNvCxnSpPr>
+          <p:nvPr/>
+        </p:nvCxnSpPr>
+        <p:spPr>
+          <a:xfrm flipH="1" flipV="1">
+            <a:off x="3656239" y="3159295"/>
+            <a:ext cx="711344" cy="823172"/>
+          </a:xfrm>
+          <a:prstGeom prst="straightConnector1">
+            <a:avLst/>
+          </a:prstGeom>
+          <a:ln>
+            <a:tailEnd type="triangle"/>
+          </a:ln>
+        </p:spPr>
+        <p:style>
+          <a:lnRef idx="2">
+            <a:schemeClr val="accent1"/>
+          </a:lnRef>
+          <a:fillRef idx="0">
+            <a:schemeClr val="accent1"/>
+          </a:fillRef>
+          <a:effectRef idx="1">
+            <a:schemeClr val="accent1"/>
+          </a:effectRef>
+          <a:fontRef idx="minor">
+            <a:schemeClr val="tx1"/>
+          </a:fontRef>
+        </p:style>
+      </p:cxnSp>
+      <p:cxnSp>
+        <p:nvCxnSpPr>
+          <p:cNvPr id="240" name="Straight Arrow Connector 239">
+            <a:extLst>
+              <a:ext uri="{FF2B5EF4-FFF2-40B4-BE49-F238E27FC236}">
+                <a16:creationId xmlns:a16="http://schemas.microsoft.com/office/drawing/2014/main" xmlns="" id="{631769FC-9784-1F43-9FB5-F30325BC3200}"/>
+              </a:ext>
+            </a:extLst>
+          </p:cNvPr>
+          <p:cNvCxnSpPr>
+            <a:stCxn id="221" idx="0"/>
+            <a:endCxn id="11" idx="3"/>
+          </p:cNvCxnSpPr>
+          <p:nvPr/>
+        </p:nvCxnSpPr>
+        <p:spPr>
+          <a:xfrm flipV="1">
+            <a:off x="4367582" y="3169948"/>
+            <a:ext cx="717803" cy="812519"/>
+          </a:xfrm>
+          <a:prstGeom prst="straightConnector1">
+            <a:avLst/>
+          </a:prstGeom>
+          <a:ln>
+            <a:tailEnd type="triangle"/>
+          </a:ln>
+        </p:spPr>
+        <p:style>
+          <a:lnRef idx="2">
+            <a:schemeClr val="accent1"/>
+          </a:lnRef>
+          <a:fillRef idx="0">
+            <a:schemeClr val="accent1"/>
+          </a:fillRef>
+          <a:effectRef idx="1">
+            <a:schemeClr val="accent1"/>
+          </a:effectRef>
+          <a:fontRef idx="minor">
+            <a:schemeClr val="tx1"/>
+          </a:fontRef>
+        </p:style>
+      </p:cxnSp>
+      <p:cxnSp>
+        <p:nvCxnSpPr>
+          <p:cNvPr id="244" name="Straight Arrow Connector 243">
+            <a:extLst>
+              <a:ext uri="{FF2B5EF4-FFF2-40B4-BE49-F238E27FC236}">
+                <a16:creationId xmlns:a16="http://schemas.microsoft.com/office/drawing/2014/main" xmlns="" id="{12C9F00E-FF54-624A-A412-389AEB0199E3}"/>
+              </a:ext>
+            </a:extLst>
+          </p:cNvPr>
+          <p:cNvCxnSpPr>
+            <a:stCxn id="18" idx="0"/>
+            <a:endCxn id="11" idx="4"/>
+          </p:cNvCxnSpPr>
+          <p:nvPr/>
+        </p:nvCxnSpPr>
+        <p:spPr>
+          <a:xfrm flipV="1">
+            <a:off x="5680186" y="3311183"/>
+            <a:ext cx="0" cy="656378"/>
+          </a:xfrm>
+          <a:prstGeom prst="straightConnector1">
+            <a:avLst/>
+          </a:prstGeom>
+          <a:ln>
+            <a:tailEnd type="triangle"/>
+          </a:ln>
+        </p:spPr>
+        <p:style>
+          <a:lnRef idx="2">
+            <a:schemeClr val="accent1"/>
+          </a:lnRef>
+          <a:fillRef idx="0">
+            <a:schemeClr val="accent1"/>
+          </a:fillRef>
+          <a:effectRef idx="1">
+            <a:schemeClr val="accent1"/>
+          </a:effectRef>
+          <a:fontRef idx="minor">
+            <a:schemeClr val="tx1"/>
+          </a:fontRef>
+        </p:style>
+      </p:cxnSp>
+      <p:cxnSp>
+        <p:nvCxnSpPr>
+          <p:cNvPr id="252" name="Straight Arrow Connector 251">
+            <a:extLst>
+              <a:ext uri="{FF2B5EF4-FFF2-40B4-BE49-F238E27FC236}">
+                <a16:creationId xmlns:a16="http://schemas.microsoft.com/office/drawing/2014/main" xmlns="" id="{898A79A1-DBE8-B14C-A3B3-2D01E211F16B}"/>
+              </a:ext>
+            </a:extLst>
+          </p:cNvPr>
+          <p:cNvCxnSpPr>
+            <a:cxnSpLocks/>
+            <a:stCxn id="222" idx="2"/>
+            <a:endCxn id="11" idx="6"/>
+          </p:cNvCxnSpPr>
+          <p:nvPr/>
+        </p:nvCxnSpPr>
+        <p:spPr>
+          <a:xfrm flipH="1">
+            <a:off x="6521362" y="2828980"/>
+            <a:ext cx="560489" cy="0"/>
+          </a:xfrm>
+          <a:prstGeom prst="straightConnector1">
+            <a:avLst/>
+          </a:prstGeom>
+          <a:ln>
+            <a:tailEnd type="triangle"/>
+          </a:ln>
+        </p:spPr>
+        <p:style>
+          <a:lnRef idx="2">
+            <a:schemeClr val="accent1"/>
+          </a:lnRef>
+          <a:fillRef idx="0">
+            <a:schemeClr val="accent1"/>
+          </a:fillRef>
+          <a:effectRef idx="1">
+            <a:schemeClr val="accent1"/>
+          </a:effectRef>
+          <a:fontRef idx="minor">
+            <a:schemeClr val="tx1"/>
+          </a:fontRef>
+        </p:style>
+      </p:cxnSp>
+      <p:sp>
+        <p:nvSpPr>
+          <p:cNvPr id="354" name="Slide Number Placeholder 3">
+            <a:extLst>
+              <a:ext uri="{FF2B5EF4-FFF2-40B4-BE49-F238E27FC236}">
+                <a16:creationId xmlns:a16="http://schemas.microsoft.com/office/drawing/2014/main" xmlns="" id="{13CF0711-7CA3-C44B-973C-571234E36114}"/>
+              </a:ext>
+            </a:extLst>
+          </p:cNvPr>
+          <p:cNvSpPr>
+            <a:spLocks noGrp="1"/>
+          </p:cNvSpPr>
+          <p:nvPr>
+            <p:ph type="sldNum" sz="quarter" idx="12"/>
+          </p:nvPr>
+        </p:nvSpPr>
+        <p:spPr>
+          <a:xfrm>
+            <a:off x="6858000" y="4800600"/>
+            <a:ext cx="2133600" cy="273844"/>
+          </a:xfrm>
+        </p:spPr>
+        <p:txBody>
+          <a:bodyPr/>
+          <a:lstStyle/>
+          <a:p>
+            <a:fld id="{47445CB2-BF6F-6E49-AC61-7BDDE2E02F5B}" type="slidenum">
+              <a:rPr lang="en-US" smtClean="0"/>
+              <a:t>60</a:t>
+            </a:fld>
+            <a:endParaRPr lang="en-US" dirty="0"/>
+          </a:p>
+        </p:txBody>
+      </p:sp>
+      <p:sp>
+        <p:nvSpPr>
+          <p:cNvPr id="355" name="Oval 354">
+            <a:extLst>
+              <a:ext uri="{FF2B5EF4-FFF2-40B4-BE49-F238E27FC236}">
+                <a16:creationId xmlns:a16="http://schemas.microsoft.com/office/drawing/2014/main" xmlns="" id="{F484B83C-D55D-F846-A75C-B293D1E9F30B}"/>
+              </a:ext>
+            </a:extLst>
+          </p:cNvPr>
+          <p:cNvSpPr/>
+          <p:nvPr/>
+        </p:nvSpPr>
+        <p:spPr>
+          <a:xfrm>
+            <a:off x="7473219" y="4157466"/>
+            <a:ext cx="903163" cy="602095"/>
+          </a:xfrm>
+          <a:prstGeom prst="ellipse">
+            <a:avLst/>
+          </a:prstGeom>
+          <a:solidFill>
+            <a:schemeClr val="accent5">
+              <a:lumMod val="40000"/>
+              <a:lumOff val="60000"/>
+            </a:schemeClr>
+          </a:solidFill>
+        </p:spPr>
+        <p:style>
+          <a:lnRef idx="2">
+            <a:schemeClr val="dk1"/>
+          </a:lnRef>
+          <a:fillRef idx="1">
+            <a:schemeClr val="lt1"/>
+          </a:fillRef>
+          <a:effectRef idx="0">
+            <a:schemeClr val="dk1"/>
+          </a:effectRef>
+          <a:fontRef idx="minor">
+            <a:schemeClr val="dk1"/>
+          </a:fontRef>
+        </p:style>
+        <p:txBody>
+          <a:bodyPr rtlCol="0" anchor="ctr"/>
+          <a:lstStyle/>
+          <a:p>
+            <a:pPr algn="ctr"/>
+            <a:r>
+              <a:rPr lang="en-US" sz="750" dirty="0">
+                <a:solidFill>
+                  <a:schemeClr val="tx1"/>
+                </a:solidFill>
+              </a:rPr>
+              <a:t>Experimental Design &amp; Causal Inference</a:t>
+            </a:r>
+          </a:p>
+        </p:txBody>
+      </p:sp>
+      <p:cxnSp>
+        <p:nvCxnSpPr>
+          <p:cNvPr id="44" name="Straight Arrow Connector 43">
+            <a:extLst>
+              <a:ext uri="{FF2B5EF4-FFF2-40B4-BE49-F238E27FC236}">
+                <a16:creationId xmlns:a16="http://schemas.microsoft.com/office/drawing/2014/main" xmlns="" id="{2A4F266C-9C4B-1345-A83D-AC8A967A9888}"/>
+              </a:ext>
+            </a:extLst>
+          </p:cNvPr>
+          <p:cNvCxnSpPr/>
+          <p:nvPr/>
+        </p:nvCxnSpPr>
+        <p:spPr>
+          <a:xfrm flipH="1" flipV="1">
+            <a:off x="3656238" y="3159296"/>
+            <a:ext cx="2023948" cy="808265"/>
+          </a:xfrm>
+          <a:prstGeom prst="straightConnector1">
+            <a:avLst/>
+          </a:prstGeom>
+          <a:ln>
+            <a:tailEnd type="triangle"/>
+          </a:ln>
+        </p:spPr>
+        <p:style>
+          <a:lnRef idx="2">
+            <a:schemeClr val="accent1"/>
+          </a:lnRef>
+          <a:fillRef idx="0">
+            <a:schemeClr val="accent1"/>
+          </a:fillRef>
+          <a:effectRef idx="1">
+            <a:schemeClr val="accent1"/>
+          </a:effectRef>
+          <a:fontRef idx="minor">
+            <a:schemeClr val="tx1"/>
+          </a:fontRef>
+        </p:style>
+      </p:cxnSp>
+    </p:spTree>
+    <p:extLst>
+      <p:ext uri="{BB962C8B-B14F-4D97-AF65-F5344CB8AC3E}">
+        <p14:creationId xmlns:p14="http://schemas.microsoft.com/office/powerpoint/2010/main" val="254849464"/>
+      </p:ext>
+    </p:extLst>
+  </p:cSld>
+  <p:clrMapOvr>
+    <a:masterClrMapping/>
+  </p:clrMapOvr>
+  <p:timing>
+    <p:tnLst>
+      <p:par>
+        <p:cTn id="1" dur="indefinite" restart="never" nodeType="tmRoot"/>
+      </p:par>
+    </p:tnLst>
+  </p:timing>
+</p:sld>
+</file>
+
+<file path=ppt/slides/slide61.xml><?xml version="1.0" encoding="utf-8"?>
+<p:sld xmlns:a="http://schemas.openxmlformats.org/drawingml/2006/main" xmlns:r="http://schemas.openxmlformats.org/officeDocument/2006/relationships" xmlns:p="http://schemas.openxmlformats.org/presentationml/2006/main">
+  <p:cSld>
+    <p:spTree>
+      <p:nvGrpSpPr>
+        <p:cNvPr id="1" name=""/>
+        <p:cNvGrpSpPr/>
+        <p:nvPr/>
+      </p:nvGrpSpPr>
+      <p:grpSpPr>
+        <a:xfrm>
+          <a:off x="0" y="0"/>
+          <a:ext cx="0" cy="0"/>
+          <a:chOff x="0" y="0"/>
+          <a:chExt cx="0" cy="0"/>
+        </a:xfrm>
+      </p:grpSpPr>
+    </p:spTree>
+    <p:extLst>
+      <p:ext uri="{BB962C8B-B14F-4D97-AF65-F5344CB8AC3E}">
+        <p14:creationId xmlns:p14="http://schemas.microsoft.com/office/powerpoint/2010/main" val="1279256260"/>
+      </p:ext>
+    </p:extLst>
+  </p:cSld>
+  <p:clrMapOvr>
+    <a:masterClrMapping/>
+  </p:clrMapOvr>
+  <p:timing>
+    <p:tnLst>
+      <p:par>
+        <p:cTn id="1" dur="indefinite" restart="never" nodeType="tmRoot"/>
+      </p:par>
+    </p:tnLst>
+  </p:timing>
+</p:sld>
+</file>
+
+<file path=ppt/slides/slide62.xml><?xml version="1.0" encoding="utf-8"?>
+<p:sld xmlns:a="http://schemas.openxmlformats.org/drawingml/2006/main" xmlns:r="http://schemas.openxmlformats.org/officeDocument/2006/relationships" xmlns:p="http://schemas.openxmlformats.org/presentationml/2006/main">
+  <p:cSld>
+    <p:spTree>
+      <p:nvGrpSpPr>
+        <p:cNvPr id="1" name=""/>
+        <p:cNvGrpSpPr/>
+        <p:nvPr/>
+      </p:nvGrpSpPr>
+      <p:grpSpPr>
+        <a:xfrm>
+          <a:off x="0" y="0"/>
+          <a:ext cx="0" cy="0"/>
+          <a:chOff x="0" y="0"/>
+          <a:chExt cx="0" cy="0"/>
+        </a:xfrm>
+      </p:grpSpPr>
+      <p:sp>
+        <p:nvSpPr>
+          <p:cNvPr id="2" name="Slide Number Placeholder 1"/>
+          <p:cNvSpPr>
+            <a:spLocks noGrp="1"/>
+          </p:cNvSpPr>
+          <p:nvPr>
+            <p:ph type="sldNum" sz="quarter" idx="12"/>
+          </p:nvPr>
+        </p:nvSpPr>
+        <p:spPr/>
+        <p:txBody>
+          <a:bodyPr/>
+          <a:lstStyle/>
+          <a:p>
+            <a:pPr marL="0" lvl="0" indent="0" algn="r" rtl="0">
+              <a:spcBef>
+                <a:spcPts val="0"/>
+              </a:spcBef>
+              <a:spcAft>
+                <a:spcPts val="0"/>
+              </a:spcAft>
+              <a:buNone/>
+            </a:pPr>
+            <a:fld id="{00000000-1234-1234-1234-123412341234}" type="slidenum">
+              <a:rPr lang="uk-UA" smtClean="0"/>
+              <a:t>62</a:t>
+            </a:fld>
+            <a:endParaRPr lang="uk-UA"/>
+          </a:p>
+        </p:txBody>
+      </p:sp>
+      <p:sp>
+        <p:nvSpPr>
+          <p:cNvPr id="3" name="Rectangle 2"/>
+          <p:cNvSpPr/>
+          <p:nvPr/>
+        </p:nvSpPr>
+        <p:spPr>
+          <a:xfrm>
+            <a:off x="709410" y="2110085"/>
+            <a:ext cx="7725192" cy="1754326"/>
+          </a:xfrm>
+          <a:prstGeom prst="rect">
+            <a:avLst/>
+          </a:prstGeom>
+          <a:noFill/>
+        </p:spPr>
+        <p:txBody>
+          <a:bodyPr wrap="none" lIns="91440" tIns="45720" rIns="91440" bIns="45720">
+            <a:spAutoFit/>
+          </a:bodyPr>
+          <a:lstStyle/>
+          <a:p>
+            <a:pPr algn="ctr"/>
+            <a:r>
+              <a:rPr lang="en-US" sz="5400" dirty="0" smtClean="0">
+                <a:ln w="0"/>
+                <a:solidFill>
+                  <a:schemeClr val="tx1"/>
+                </a:solidFill>
+                <a:effectLst>
+                  <a:outerShdw blurRad="38100" dist="19050" dir="2700000" algn="tl" rotWithShape="0">
+                    <a:schemeClr val="dk1">
+                      <a:alpha val="40000"/>
+                    </a:schemeClr>
+                  </a:outerShdw>
+                </a:effectLst>
+              </a:rPr>
+              <a:t>I am Pavlos Protopapas </a:t>
+            </a:r>
+          </a:p>
+          <a:p>
+            <a:pPr algn="ctr"/>
+            <a:r>
+              <a:rPr lang="en-US" sz="5400" dirty="0" smtClean="0">
+                <a:ln w="0"/>
+                <a:solidFill>
+                  <a:schemeClr val="tx1"/>
+                </a:solidFill>
+                <a:effectLst>
+                  <a:outerShdw blurRad="38100" dist="19050" dir="2700000" algn="tl" rotWithShape="0">
+                    <a:schemeClr val="dk1">
+                      <a:alpha val="40000"/>
+                    </a:schemeClr>
+                  </a:outerShdw>
+                </a:effectLst>
+              </a:rPr>
+              <a:t>Thank you! </a:t>
+            </a:r>
+          </a:p>
+        </p:txBody>
+      </p:sp>
+    </p:spTree>
+    <p:extLst>
+      <p:ext uri="{BB962C8B-B14F-4D97-AF65-F5344CB8AC3E}">
+        <p14:creationId xmlns:p14="http://schemas.microsoft.com/office/powerpoint/2010/main" val="1306003186"/>
+      </p:ext>
+    </p:extLst>
+  </p:cSld>
+  <p:clrMapOvr>
+    <a:masterClrMapping/>
+  </p:clrMapOvr>
+  <p:timing>
+    <p:tnLst>
+      <p:par>
+        <p:cTn id="1" dur="indefinite" restart="never" nodeType="tmRoot"/>
+      </p:par>
+    </p:tnLst>
+  </p:timing>
+</p:sld>
+</file>
+
 <file path=ppt/slides/slide7.xml><?xml version="1.0" encoding="utf-8"?>
 <p:sld xmlns:a="http://schemas.openxmlformats.org/drawingml/2006/main" xmlns:r="http://schemas.openxmlformats.org/officeDocument/2006/relationships" xmlns:p="http://schemas.openxmlformats.org/presentationml/2006/main">
   <p:cSld>

</xml_diff>